<commit_message>
made changes to KilpatrickShaun_GPA1-A
</commit_message>
<xml_diff>
--- a/KilpatrickShaun_GPA1-A.pptx
+++ b/KilpatrickShaun_GPA1-A.pptx
@@ -6,6 +6,7 @@
   </p:sldMasterIdLst>
   <p:sldIdLst>
     <p:sldId id="256" r:id="rId2"/>
+    <p:sldId id="257" r:id="rId3"/>
   </p:sldIdLst>
   <p:sldSz cx="12192000" cy="6858000"/>
   <p:notesSz cx="6858000" cy="9144000"/>
@@ -104,6 +105,11 @@
       </a:defRPr>
     </a:lvl9pPr>
   </p:defaultTextStyle>
+  <p:extLst>
+    <p:ext uri="{EFAFB233-063F-42B5-8137-9DF3F51BA10A}">
+      <p15:sldGuideLst xmlns:p15="http://schemas.microsoft.com/office/powerpoint/2012/main"/>
+    </p:ext>
+  </p:extLst>
 </p:presentation>
 </file>
 
@@ -254,7 +260,7 @@
           <a:p>
             <a:fld id="{766DAB4B-EA57-4C6C-BB8C-2815EB4A1031}" type="datetimeFigureOut">
               <a:rPr lang="en-US" smtClean="0"/>
-              <a:t>1/8/2025</a:t>
+              <a:t>4/7/2025</a:t>
             </a:fld>
             <a:endParaRPr lang="en-US"/>
           </a:p>
@@ -452,7 +458,7 @@
           <a:p>
             <a:fld id="{766DAB4B-EA57-4C6C-BB8C-2815EB4A1031}" type="datetimeFigureOut">
               <a:rPr lang="en-US" smtClean="0"/>
-              <a:t>1/8/2025</a:t>
+              <a:t>4/7/2025</a:t>
             </a:fld>
             <a:endParaRPr lang="en-US"/>
           </a:p>
@@ -660,7 +666,7 @@
           <a:p>
             <a:fld id="{766DAB4B-EA57-4C6C-BB8C-2815EB4A1031}" type="datetimeFigureOut">
               <a:rPr lang="en-US" smtClean="0"/>
-              <a:t>1/8/2025</a:t>
+              <a:t>4/7/2025</a:t>
             </a:fld>
             <a:endParaRPr lang="en-US"/>
           </a:p>
@@ -858,7 +864,7 @@
           <a:p>
             <a:fld id="{766DAB4B-EA57-4C6C-BB8C-2815EB4A1031}" type="datetimeFigureOut">
               <a:rPr lang="en-US" smtClean="0"/>
-              <a:t>1/8/2025</a:t>
+              <a:t>4/7/2025</a:t>
             </a:fld>
             <a:endParaRPr lang="en-US"/>
           </a:p>
@@ -1133,7 +1139,7 @@
           <a:p>
             <a:fld id="{766DAB4B-EA57-4C6C-BB8C-2815EB4A1031}" type="datetimeFigureOut">
               <a:rPr lang="en-US" smtClean="0"/>
-              <a:t>1/8/2025</a:t>
+              <a:t>4/7/2025</a:t>
             </a:fld>
             <a:endParaRPr lang="en-US"/>
           </a:p>
@@ -1398,7 +1404,7 @@
           <a:p>
             <a:fld id="{766DAB4B-EA57-4C6C-BB8C-2815EB4A1031}" type="datetimeFigureOut">
               <a:rPr lang="en-US" smtClean="0"/>
-              <a:t>1/8/2025</a:t>
+              <a:t>4/7/2025</a:t>
             </a:fld>
             <a:endParaRPr lang="en-US"/>
           </a:p>
@@ -1810,7 +1816,7 @@
           <a:p>
             <a:fld id="{766DAB4B-EA57-4C6C-BB8C-2815EB4A1031}" type="datetimeFigureOut">
               <a:rPr lang="en-US" smtClean="0"/>
-              <a:t>1/8/2025</a:t>
+              <a:t>4/7/2025</a:t>
             </a:fld>
             <a:endParaRPr lang="en-US"/>
           </a:p>
@@ -1951,7 +1957,7 @@
           <a:p>
             <a:fld id="{766DAB4B-EA57-4C6C-BB8C-2815EB4A1031}" type="datetimeFigureOut">
               <a:rPr lang="en-US" smtClean="0"/>
-              <a:t>1/8/2025</a:t>
+              <a:t>4/7/2025</a:t>
             </a:fld>
             <a:endParaRPr lang="en-US"/>
           </a:p>
@@ -2064,7 +2070,7 @@
           <a:p>
             <a:fld id="{766DAB4B-EA57-4C6C-BB8C-2815EB4A1031}" type="datetimeFigureOut">
               <a:rPr lang="en-US" smtClean="0"/>
-              <a:t>1/8/2025</a:t>
+              <a:t>4/7/2025</a:t>
             </a:fld>
             <a:endParaRPr lang="en-US"/>
           </a:p>
@@ -2375,7 +2381,7 @@
           <a:p>
             <a:fld id="{766DAB4B-EA57-4C6C-BB8C-2815EB4A1031}" type="datetimeFigureOut">
               <a:rPr lang="en-US" smtClean="0"/>
-              <a:t>1/8/2025</a:t>
+              <a:t>4/7/2025</a:t>
             </a:fld>
             <a:endParaRPr lang="en-US"/>
           </a:p>
@@ -2663,7 +2669,7 @@
           <a:p>
             <a:fld id="{766DAB4B-EA57-4C6C-BB8C-2815EB4A1031}" type="datetimeFigureOut">
               <a:rPr lang="en-US" smtClean="0"/>
-              <a:t>1/8/2025</a:t>
+              <a:t>4/7/2025</a:t>
             </a:fld>
             <a:endParaRPr lang="en-US"/>
           </a:p>
@@ -2904,7 +2910,7 @@
           <a:p>
             <a:fld id="{766DAB4B-EA57-4C6C-BB8C-2815EB4A1031}" type="datetimeFigureOut">
               <a:rPr lang="en-US" smtClean="0"/>
-              <a:t>1/8/2025</a:t>
+              <a:t>4/7/2025</a:t>
             </a:fld>
             <a:endParaRPr lang="en-US"/>
           </a:p>
@@ -3411,6 +3417,96 @@
     <p:extLst>
       <p:ext uri="{BB962C8B-B14F-4D97-AF65-F5344CB8AC3E}">
         <p14:creationId xmlns:p14="http://schemas.microsoft.com/office/powerpoint/2010/main" val="2441408343"/>
+      </p:ext>
+    </p:extLst>
+  </p:cSld>
+  <p:clrMapOvr>
+    <a:masterClrMapping/>
+  </p:clrMapOvr>
+</p:sld>
+</file>
+
+<file path=ppt/slides/slide2.xml><?xml version="1.0" encoding="utf-8"?>
+<p:sld xmlns:a="http://schemas.openxmlformats.org/drawingml/2006/main" xmlns:r="http://schemas.openxmlformats.org/officeDocument/2006/relationships" xmlns:p="http://schemas.openxmlformats.org/presentationml/2006/main">
+  <p:cSld>
+    <p:spTree>
+      <p:nvGrpSpPr>
+        <p:cNvPr id="1" name=""/>
+        <p:cNvGrpSpPr/>
+        <p:nvPr/>
+      </p:nvGrpSpPr>
+      <p:grpSpPr>
+        <a:xfrm>
+          <a:off x="0" y="0"/>
+          <a:ext cx="0" cy="0"/>
+          <a:chOff x="0" y="0"/>
+          <a:chExt cx="0" cy="0"/>
+        </a:xfrm>
+      </p:grpSpPr>
+      <p:sp>
+        <p:nvSpPr>
+          <p:cNvPr id="2" name="Title 1">
+            <a:extLst>
+              <a:ext uri="{FF2B5EF4-FFF2-40B4-BE49-F238E27FC236}">
+                <a16:creationId xmlns:a16="http://schemas.microsoft.com/office/drawing/2014/main" id="{B562AF43-0A55-B948-A73D-A41E9ED01679}"/>
+              </a:ext>
+            </a:extLst>
+          </p:cNvPr>
+          <p:cNvSpPr>
+            <a:spLocks noGrp="1"/>
+          </p:cNvSpPr>
+          <p:nvPr>
+            <p:ph type="title"/>
+          </p:nvPr>
+        </p:nvSpPr>
+        <p:spPr/>
+        <p:txBody>
+          <a:bodyPr/>
+          <a:lstStyle/>
+          <a:p>
+            <a:endParaRPr lang="en-US"/>
+          </a:p>
+        </p:txBody>
+      </p:sp>
+      <p:pic>
+        <p:nvPicPr>
+          <p:cNvPr id="5" name="Content Placeholder 4" descr="A road leading to mountains&#10;&#10;AI-generated content may be incorrect.">
+            <a:extLst>
+              <a:ext uri="{FF2B5EF4-FFF2-40B4-BE49-F238E27FC236}">
+                <a16:creationId xmlns:a16="http://schemas.microsoft.com/office/drawing/2014/main" id="{25798CD8-E531-11DA-B2EB-2EC43E4CC5C5}"/>
+              </a:ext>
+            </a:extLst>
+          </p:cNvPr>
+          <p:cNvPicPr>
+            <a:picLocks noGrp="1" noChangeAspect="1"/>
+          </p:cNvPicPr>
+          <p:nvPr>
+            <p:ph idx="1"/>
+          </p:nvPr>
+        </p:nvPicPr>
+        <p:blipFill>
+          <a:blip r:embed="rId2">
+            <a:extLst>
+              <a:ext uri="{28A0092B-C50C-407E-A947-70E740481C1C}">
+                <a14:useLocalDpi xmlns:a14="http://schemas.microsoft.com/office/drawing/2010/main" val="0"/>
+              </a:ext>
+            </a:extLst>
+          </a:blip>
+          <a:stretch>
+            <a:fillRect/>
+          </a:stretch>
+        </p:blipFill>
+        <p:spPr>
+          <a:xfrm>
+            <a:off x="2228144" y="1825625"/>
+            <a:ext cx="7735712" cy="4351338"/>
+          </a:xfrm>
+        </p:spPr>
+      </p:pic>
+    </p:spTree>
+    <p:extLst>
+      <p:ext uri="{BB962C8B-B14F-4D97-AF65-F5344CB8AC3E}">
+        <p14:creationId xmlns:p14="http://schemas.microsoft.com/office/powerpoint/2010/main" val="855147035"/>
       </p:ext>
     </p:extLst>
   </p:cSld>

</xml_diff>